<commit_message>
working on index file
</commit_message>
<xml_diff>
--- a/img/logo.pptx
+++ b/img/logo.pptx
@@ -10,6 +10,8 @@
     <p:sldId id="258" r:id="rId4"/>
     <p:sldId id="259" r:id="rId5"/>
     <p:sldId id="260" r:id="rId6"/>
+    <p:sldId id="262" r:id="rId7"/>
+    <p:sldId id="261" r:id="rId8"/>
   </p:sldIdLst>
   <p:sldSz cx="12192000" cy="6858000"/>
   <p:notesSz cx="6858000" cy="9144000"/>
@@ -16008,6 +16010,333 @@
 </p:sld>
 </file>
 
+<file path=ppt/slides/slide6.xml><?xml version="1.0" encoding="utf-8"?>
+<p:sld xmlns:a="http://schemas.openxmlformats.org/drawingml/2006/main" xmlns:r="http://schemas.openxmlformats.org/officeDocument/2006/relationships" xmlns:p="http://schemas.openxmlformats.org/presentationml/2006/main">
+  <p:cSld>
+    <p:spTree>
+      <p:nvGrpSpPr>
+        <p:cNvPr id="1" name=""/>
+        <p:cNvGrpSpPr/>
+        <p:nvPr/>
+      </p:nvGrpSpPr>
+      <p:grpSpPr>
+        <a:xfrm>
+          <a:off x="0" y="0"/>
+          <a:ext cx="0" cy="0"/>
+          <a:chOff x="0" y="0"/>
+          <a:chExt cx="0" cy="0"/>
+        </a:xfrm>
+      </p:grpSpPr>
+      <p:pic>
+        <p:nvPicPr>
+          <p:cNvPr id="7" name="Picture 6"/>
+          <p:cNvPicPr>
+            <a:picLocks noChangeAspect="1"/>
+          </p:cNvPicPr>
+          <p:nvPr/>
+        </p:nvPicPr>
+        <p:blipFill>
+          <a:blip r:embed="rId2">
+            <a:clrChange>
+              <a:clrFrom>
+                <a:srgbClr val="FFFFFF"/>
+              </a:clrFrom>
+              <a:clrTo>
+                <a:srgbClr val="FFFFFF">
+                  <a:alpha val="0"/>
+                </a:srgbClr>
+              </a:clrTo>
+            </a:clrChange>
+            <a:extLst>
+              <a:ext uri="{28A0092B-C50C-407E-A947-70E740481C1C}">
+                <a14:useLocalDpi xmlns:a14="http://schemas.microsoft.com/office/drawing/2010/main" val="0"/>
+              </a:ext>
+            </a:extLst>
+          </a:blip>
+          <a:stretch>
+            <a:fillRect/>
+          </a:stretch>
+        </p:blipFill>
+        <p:spPr>
+          <a:xfrm>
+            <a:off x="481263" y="1014162"/>
+            <a:ext cx="3048000" cy="1428750"/>
+          </a:xfrm>
+          <a:prstGeom prst="rect">
+            <a:avLst/>
+          </a:prstGeom>
+        </p:spPr>
+      </p:pic>
+      <p:pic>
+        <p:nvPicPr>
+          <p:cNvPr id="9" name="Picture 8"/>
+          <p:cNvPicPr>
+            <a:picLocks noChangeAspect="1"/>
+          </p:cNvPicPr>
+          <p:nvPr/>
+        </p:nvPicPr>
+        <p:blipFill>
+          <a:blip r:embed="rId3">
+            <a:clrChange>
+              <a:clrFrom>
+                <a:srgbClr val="FFFFFF"/>
+              </a:clrFrom>
+              <a:clrTo>
+                <a:srgbClr val="FFFFFF">
+                  <a:alpha val="0"/>
+                </a:srgbClr>
+              </a:clrTo>
+            </a:clrChange>
+            <a:extLst>
+              <a:ext uri="{28A0092B-C50C-407E-A947-70E740481C1C}">
+                <a14:useLocalDpi xmlns:a14="http://schemas.microsoft.com/office/drawing/2010/main" val="0"/>
+              </a:ext>
+            </a:extLst>
+          </a:blip>
+          <a:stretch>
+            <a:fillRect/>
+          </a:stretch>
+        </p:blipFill>
+        <p:spPr>
+          <a:xfrm>
+            <a:off x="689811" y="3155282"/>
+            <a:ext cx="6096000" cy="2857500"/>
+          </a:xfrm>
+          <a:prstGeom prst="rect">
+            <a:avLst/>
+          </a:prstGeom>
+        </p:spPr>
+      </p:pic>
+      <p:pic>
+        <p:nvPicPr>
+          <p:cNvPr id="11" name="Picture 10"/>
+          <p:cNvPicPr>
+            <a:picLocks noChangeAspect="1"/>
+          </p:cNvPicPr>
+          <p:nvPr/>
+        </p:nvPicPr>
+        <p:blipFill>
+          <a:blip r:embed="rId4">
+            <a:clrChange>
+              <a:clrFrom>
+                <a:srgbClr val="FFFFFF"/>
+              </a:clrFrom>
+              <a:clrTo>
+                <a:srgbClr val="FFFFFF">
+                  <a:alpha val="0"/>
+                </a:srgbClr>
+              </a:clrTo>
+            </a:clrChange>
+            <a:extLst>
+              <a:ext uri="{28A0092B-C50C-407E-A947-70E740481C1C}">
+                <a14:useLocalDpi xmlns:a14="http://schemas.microsoft.com/office/drawing/2010/main" val="0"/>
+              </a:ext>
+            </a:extLst>
+          </a:blip>
+          <a:stretch>
+            <a:fillRect/>
+          </a:stretch>
+        </p:blipFill>
+        <p:spPr>
+          <a:xfrm>
+            <a:off x="7040880" y="1006893"/>
+            <a:ext cx="3048000" cy="1428750"/>
+          </a:xfrm>
+          <a:prstGeom prst="rect">
+            <a:avLst/>
+          </a:prstGeom>
+        </p:spPr>
+      </p:pic>
+      <p:pic>
+        <p:nvPicPr>
+          <p:cNvPr id="13" name="Picture 12"/>
+          <p:cNvPicPr>
+            <a:picLocks noChangeAspect="1"/>
+          </p:cNvPicPr>
+          <p:nvPr/>
+        </p:nvPicPr>
+        <p:blipFill rotWithShape="1">
+          <a:blip r:embed="rId5">
+            <a:extLst>
+              <a:ext uri="{28A0092B-C50C-407E-A947-70E740481C1C}">
+                <a14:useLocalDpi xmlns:a14="http://schemas.microsoft.com/office/drawing/2010/main" val="0"/>
+              </a:ext>
+            </a:extLst>
+          </a:blip>
+          <a:srcRect l="20757" t="32361" r="46807" b="35403"/>
+          <a:stretch/>
+        </p:blipFill>
+        <p:spPr>
+          <a:xfrm>
+            <a:off x="8871285" y="3785937"/>
+            <a:ext cx="790876" cy="786064"/>
+          </a:xfrm>
+          <a:prstGeom prst="rect">
+            <a:avLst/>
+          </a:prstGeom>
+        </p:spPr>
+      </p:pic>
+      <p:pic>
+        <p:nvPicPr>
+          <p:cNvPr id="15" name="Picture 14"/>
+          <p:cNvPicPr>
+            <a:picLocks noChangeAspect="1"/>
+          </p:cNvPicPr>
+          <p:nvPr/>
+        </p:nvPicPr>
+        <p:blipFill>
+          <a:blip r:embed="rId6">
+            <a:clrChange>
+              <a:clrFrom>
+                <a:srgbClr val="FFFFFF"/>
+              </a:clrFrom>
+              <a:clrTo>
+                <a:srgbClr val="FFFFFF">
+                  <a:alpha val="0"/>
+                </a:srgbClr>
+              </a:clrTo>
+            </a:clrChange>
+            <a:extLst>
+              <a:ext uri="{28A0092B-C50C-407E-A947-70E740481C1C}">
+                <a14:useLocalDpi xmlns:a14="http://schemas.microsoft.com/office/drawing/2010/main" val="0"/>
+              </a:ext>
+            </a:extLst>
+          </a:blip>
+          <a:stretch>
+            <a:fillRect/>
+          </a:stretch>
+        </p:blipFill>
+        <p:spPr>
+          <a:xfrm>
+            <a:off x="4067334" y="1065764"/>
+            <a:ext cx="1914286" cy="1733333"/>
+          </a:xfrm>
+          <a:prstGeom prst="rect">
+            <a:avLst/>
+          </a:prstGeom>
+        </p:spPr>
+      </p:pic>
+      <p:pic>
+        <p:nvPicPr>
+          <p:cNvPr id="8" name="Picture 7"/>
+          <p:cNvPicPr>
+            <a:picLocks noChangeAspect="1"/>
+          </p:cNvPicPr>
+          <p:nvPr/>
+        </p:nvPicPr>
+        <p:blipFill>
+          <a:blip r:embed="rId7">
+            <a:clrChange>
+              <a:clrFrom>
+                <a:srgbClr val="FFFFFF"/>
+              </a:clrFrom>
+              <a:clrTo>
+                <a:srgbClr val="FFFFFF">
+                  <a:alpha val="0"/>
+                </a:srgbClr>
+              </a:clrTo>
+            </a:clrChange>
+            <a:extLst>
+              <a:ext uri="{28A0092B-C50C-407E-A947-70E740481C1C}">
+                <a14:useLocalDpi xmlns:a14="http://schemas.microsoft.com/office/drawing/2010/main" val="0"/>
+              </a:ext>
+            </a:extLst>
+          </a:blip>
+          <a:stretch>
+            <a:fillRect/>
+          </a:stretch>
+        </p:blipFill>
+        <p:spPr>
+          <a:xfrm>
+            <a:off x="3048000" y="2000250"/>
+            <a:ext cx="6096000" cy="2857500"/>
+          </a:xfrm>
+          <a:prstGeom prst="rect">
+            <a:avLst/>
+          </a:prstGeom>
+        </p:spPr>
+      </p:pic>
+    </p:spTree>
+    <p:extLst>
+      <p:ext uri="{BB962C8B-B14F-4D97-AF65-F5344CB8AC3E}">
+        <p14:creationId xmlns:p14="http://schemas.microsoft.com/office/powerpoint/2010/main" val="2471028520"/>
+      </p:ext>
+    </p:extLst>
+  </p:cSld>
+  <p:clrMapOvr>
+    <a:masterClrMapping/>
+  </p:clrMapOvr>
+</p:sld>
+</file>
+
+<file path=ppt/slides/slide7.xml><?xml version="1.0" encoding="utf-8"?>
+<p:sld xmlns:a="http://schemas.openxmlformats.org/drawingml/2006/main" xmlns:r="http://schemas.openxmlformats.org/officeDocument/2006/relationships" xmlns:p="http://schemas.openxmlformats.org/presentationml/2006/main">
+  <p:cSld>
+    <p:spTree>
+      <p:nvGrpSpPr>
+        <p:cNvPr id="1" name=""/>
+        <p:cNvGrpSpPr/>
+        <p:nvPr/>
+      </p:nvGrpSpPr>
+      <p:grpSpPr>
+        <a:xfrm>
+          <a:off x="0" y="0"/>
+          <a:ext cx="0" cy="0"/>
+          <a:chOff x="0" y="0"/>
+          <a:chExt cx="0" cy="0"/>
+        </a:xfrm>
+      </p:grpSpPr>
+      <p:sp>
+        <p:nvSpPr>
+          <p:cNvPr id="2" name="Title 1"/>
+          <p:cNvSpPr>
+            <a:spLocks noGrp="1"/>
+          </p:cNvSpPr>
+          <p:nvPr>
+            <p:ph type="title"/>
+          </p:nvPr>
+        </p:nvSpPr>
+        <p:spPr/>
+        <p:txBody>
+          <a:bodyPr/>
+          <a:lstStyle/>
+          <a:p>
+            <a:endParaRPr lang="en-US"/>
+          </a:p>
+        </p:txBody>
+      </p:sp>
+      <p:sp>
+        <p:nvSpPr>
+          <p:cNvPr id="3" name="Content Placeholder 2"/>
+          <p:cNvSpPr>
+            <a:spLocks noGrp="1"/>
+          </p:cNvSpPr>
+          <p:nvPr>
+            <p:ph idx="1"/>
+          </p:nvPr>
+        </p:nvSpPr>
+        <p:spPr/>
+        <p:txBody>
+          <a:bodyPr/>
+          <a:lstStyle/>
+          <a:p>
+            <a:endParaRPr lang="en-US"/>
+          </a:p>
+        </p:txBody>
+      </p:sp>
+    </p:spTree>
+    <p:extLst>
+      <p:ext uri="{BB962C8B-B14F-4D97-AF65-F5344CB8AC3E}">
+        <p14:creationId xmlns:p14="http://schemas.microsoft.com/office/powerpoint/2010/main" val="2653415336"/>
+      </p:ext>
+    </p:extLst>
+  </p:cSld>
+  <p:clrMapOvr>
+    <a:masterClrMapping/>
+  </p:clrMapOvr>
+</p:sld>
+</file>
+
 <file path=ppt/theme/theme1.xml><?xml version="1.0" encoding="utf-8"?>
 <a:theme xmlns:a="http://schemas.openxmlformats.org/drawingml/2006/main" name="Office Theme">
   <a:themeElements>

</xml_diff>

<commit_message>
add pic to upload
</commit_message>
<xml_diff>
--- a/img/logo.pptx
+++ b/img/logo.pptx
@@ -11,7 +11,7 @@
     <p:sldId id="259" r:id="rId5"/>
     <p:sldId id="260" r:id="rId6"/>
     <p:sldId id="262" r:id="rId7"/>
-    <p:sldId id="261" r:id="rId8"/>
+    <p:sldId id="263" r:id="rId8"/>
   </p:sldIdLst>
   <p:sldSz cx="12192000" cy="6858000"/>
   <p:notesSz cx="6858000" cy="9144000"/>
@@ -247,7 +247,7 @@
           <a:p>
             <a:fld id="{593BD7EC-E229-4BE2-9288-F118C00D54B6}" type="datetimeFigureOut">
               <a:rPr lang="en-US" smtClean="0"/>
-              <a:t>3/14/2017</a:t>
+              <a:t>3/16/2017</a:t>
             </a:fld>
             <a:endParaRPr lang="en-US"/>
           </a:p>
@@ -415,7 +415,7 @@
           <a:p>
             <a:fld id="{593BD7EC-E229-4BE2-9288-F118C00D54B6}" type="datetimeFigureOut">
               <a:rPr lang="en-US" smtClean="0"/>
-              <a:t>3/14/2017</a:t>
+              <a:t>3/16/2017</a:t>
             </a:fld>
             <a:endParaRPr lang="en-US"/>
           </a:p>
@@ -593,7 +593,7 @@
           <a:p>
             <a:fld id="{593BD7EC-E229-4BE2-9288-F118C00D54B6}" type="datetimeFigureOut">
               <a:rPr lang="en-US" smtClean="0"/>
-              <a:t>3/14/2017</a:t>
+              <a:t>3/16/2017</a:t>
             </a:fld>
             <a:endParaRPr lang="en-US"/>
           </a:p>
@@ -761,7 +761,7 @@
           <a:p>
             <a:fld id="{593BD7EC-E229-4BE2-9288-F118C00D54B6}" type="datetimeFigureOut">
               <a:rPr lang="en-US" smtClean="0"/>
-              <a:t>3/14/2017</a:t>
+              <a:t>3/16/2017</a:t>
             </a:fld>
             <a:endParaRPr lang="en-US"/>
           </a:p>
@@ -1006,7 +1006,7 @@
           <a:p>
             <a:fld id="{593BD7EC-E229-4BE2-9288-F118C00D54B6}" type="datetimeFigureOut">
               <a:rPr lang="en-US" smtClean="0"/>
-              <a:t>3/14/2017</a:t>
+              <a:t>3/16/2017</a:t>
             </a:fld>
             <a:endParaRPr lang="en-US"/>
           </a:p>
@@ -1235,7 +1235,7 @@
           <a:p>
             <a:fld id="{593BD7EC-E229-4BE2-9288-F118C00D54B6}" type="datetimeFigureOut">
               <a:rPr lang="en-US" smtClean="0"/>
-              <a:t>3/14/2017</a:t>
+              <a:t>3/16/2017</a:t>
             </a:fld>
             <a:endParaRPr lang="en-US"/>
           </a:p>
@@ -1599,7 +1599,7 @@
           <a:p>
             <a:fld id="{593BD7EC-E229-4BE2-9288-F118C00D54B6}" type="datetimeFigureOut">
               <a:rPr lang="en-US" smtClean="0"/>
-              <a:t>3/14/2017</a:t>
+              <a:t>3/16/2017</a:t>
             </a:fld>
             <a:endParaRPr lang="en-US"/>
           </a:p>
@@ -1716,7 +1716,7 @@
           <a:p>
             <a:fld id="{593BD7EC-E229-4BE2-9288-F118C00D54B6}" type="datetimeFigureOut">
               <a:rPr lang="en-US" smtClean="0"/>
-              <a:t>3/14/2017</a:t>
+              <a:t>3/16/2017</a:t>
             </a:fld>
             <a:endParaRPr lang="en-US"/>
           </a:p>
@@ -1811,7 +1811,7 @@
           <a:p>
             <a:fld id="{593BD7EC-E229-4BE2-9288-F118C00D54B6}" type="datetimeFigureOut">
               <a:rPr lang="en-US" smtClean="0"/>
-              <a:t>3/14/2017</a:t>
+              <a:t>3/16/2017</a:t>
             </a:fld>
             <a:endParaRPr lang="en-US"/>
           </a:p>
@@ -2086,7 +2086,7 @@
           <a:p>
             <a:fld id="{593BD7EC-E229-4BE2-9288-F118C00D54B6}" type="datetimeFigureOut">
               <a:rPr lang="en-US" smtClean="0"/>
-              <a:t>3/14/2017</a:t>
+              <a:t>3/16/2017</a:t>
             </a:fld>
             <a:endParaRPr lang="en-US"/>
           </a:p>
@@ -2338,7 +2338,7 @@
           <a:p>
             <a:fld id="{593BD7EC-E229-4BE2-9288-F118C00D54B6}" type="datetimeFigureOut">
               <a:rPr lang="en-US" smtClean="0"/>
-              <a:t>3/14/2017</a:t>
+              <a:t>3/16/2017</a:t>
             </a:fld>
             <a:endParaRPr lang="en-US"/>
           </a:p>
@@ -2549,7 +2549,7 @@
           <a:p>
             <a:fld id="{593BD7EC-E229-4BE2-9288-F118C00D54B6}" type="datetimeFigureOut">
               <a:rPr lang="en-US" smtClean="0"/>
-              <a:t>3/14/2017</a:t>
+              <a:t>3/16/2017</a:t>
             </a:fld>
             <a:endParaRPr lang="en-US"/>
           </a:p>
@@ -16293,7 +16293,7 @@
             <a:spLocks noGrp="1"/>
           </p:cNvSpPr>
           <p:nvPr>
-            <p:ph type="title"/>
+            <p:ph type="ctrTitle"/>
           </p:nvPr>
         </p:nvSpPr>
         <p:spPr/>
@@ -16307,12 +16307,12 @@
       </p:sp>
       <p:sp>
         <p:nvSpPr>
-          <p:cNvPr id="3" name="Content Placeholder 2"/>
+          <p:cNvPr id="3" name="Subtitle 2"/>
           <p:cNvSpPr>
             <a:spLocks noGrp="1"/>
           </p:cNvSpPr>
           <p:nvPr>
-            <p:ph idx="1"/>
+            <p:ph type="subTitle" idx="1"/>
           </p:nvPr>
         </p:nvSpPr>
         <p:spPr/>
@@ -16320,14 +16320,67 @@
           <a:bodyPr/>
           <a:lstStyle/>
           <a:p>
-            <a:endParaRPr lang="en-US"/>
+            <a:pPr algn="l"/>
+            <a:r>
+              <a:rPr lang="zh-CN" altLang="en-US" dirty="0"/>
+              <a:t>图上 蓝色 </a:t>
+            </a:r>
+            <a:r>
+              <a:rPr lang="en-US" altLang="zh-CN" dirty="0"/>
+              <a:t>#52c7f7</a:t>
+            </a:r>
+          </a:p>
+          <a:p>
+            <a:pPr algn="l"/>
+            <a:r>
+              <a:rPr lang="zh-CN" altLang="en-US" dirty="0"/>
+              <a:t>黄色 </a:t>
+            </a:r>
+            <a:r>
+              <a:rPr lang="en-US" altLang="zh-CN"/>
+              <a:t>#fdd900</a:t>
+            </a:r>
+            <a:endParaRPr lang="en-US" dirty="0"/>
           </a:p>
         </p:txBody>
       </p:sp>
+      <p:pic>
+        <p:nvPicPr>
+          <p:cNvPr id="5" name="Picture 4"/>
+          <p:cNvPicPr>
+            <a:picLocks noChangeAspect="1"/>
+          </p:cNvPicPr>
+          <p:nvPr/>
+        </p:nvPicPr>
+        <p:blipFill>
+          <a:blip r:embed="rId2">
+            <a:extLst>
+              <a:ext uri="{28A0092B-C50C-407E-A947-70E740481C1C}">
+                <a14:useLocalDpi xmlns:a14="http://schemas.microsoft.com/office/drawing/2010/main" val="0"/>
+              </a:ext>
+            </a:extLst>
+          </a:blip>
+          <a:stretch>
+            <a:fillRect/>
+          </a:stretch>
+        </p:blipFill>
+        <p:spPr>
+          <a:xfrm>
+            <a:off x="4952840" y="2895525"/>
+            <a:ext cx="2286319" cy="1066949"/>
+          </a:xfrm>
+          <a:prstGeom prst="rect">
+            <a:avLst/>
+          </a:prstGeom>
+          <a:solidFill>
+            <a:srgbClr val="FDD900"/>
+          </a:solidFill>
+        </p:spPr>
+      </p:pic>
     </p:spTree>
     <p:extLst>
       <p:ext uri="{BB962C8B-B14F-4D97-AF65-F5344CB8AC3E}">
-        <p14:creationId xmlns:p14="http://schemas.microsoft.com/office/powerpoint/2010/main" val="2653415336"/>
+        <p14:creationId xmlns:p14="http://schemas.microsoft.com/office/powerpoint/2010/main" val="2703204934"/>
       </p:ext>
     </p:extLst>
   </p:cSld>

</xml_diff>

<commit_message>
working on projects. page
</commit_message>
<xml_diff>
--- a/img/logo.pptx
+++ b/img/logo.pptx
@@ -16373,7 +16373,34 @@
             <a:avLst/>
           </a:prstGeom>
           <a:solidFill>
-            <a:srgbClr val="FDD900"/>
+            <a:srgbClr val="F5B3C4"/>
+          </a:solidFill>
+        </p:spPr>
+      </p:pic>
+      <p:pic>
+        <p:nvPicPr>
+          <p:cNvPr id="4" name="Picture 3"/>
+          <p:cNvPicPr>
+            <a:picLocks noChangeAspect="1"/>
+          </p:cNvPicPr>
+          <p:nvPr/>
+        </p:nvPicPr>
+        <p:blipFill>
+          <a:blip r:embed="rId3"/>
+          <a:stretch>
+            <a:fillRect/>
+          </a:stretch>
+        </p:blipFill>
+        <p:spPr>
+          <a:xfrm>
+            <a:off x="7826148" y="4702175"/>
+            <a:ext cx="371475" cy="647700"/>
+          </a:xfrm>
+          <a:prstGeom prst="rect">
+            <a:avLst/>
+          </a:prstGeom>
+          <a:solidFill>
+            <a:srgbClr val="EEF9FE"/>
           </a:solidFill>
         </p:spPr>
       </p:pic>

</xml_diff>